<commit_message>
ajout d'animations et de transitions references #60
</commit_message>
<xml_diff>
--- a/doc/Presentation/Présentation_20_03_18_loup_garou.pptx
+++ b/doc/Presentation/Présentation_20_03_18_loup_garou.pptx
@@ -109,6 +109,11 @@
       </a:defRPr>
     </a:lvl9pPr>
   </p:defaultTextStyle>
+  <p:extLst>
+    <p:ext uri="{EFAFB233-063F-42B5-8137-9DF3F51BA10A}">
+      <p15:sldGuideLst xmlns:p15="http://schemas.microsoft.com/office/powerpoint/2012/main"/>
+    </p:ext>
+  </p:extLst>
 </p:presentation>
 </file>
 
@@ -1446,6 +1451,14 @@
   <p:clrMapOvr>
     <a:masterClrMapping/>
   </p:clrMapOvr>
+  <p:transition spd="slow">
+    <p:push dir="u"/>
+    <p:sndAc>
+      <p:stSnd>
+        <p:snd r:embed="rId1" name="Le-hurlement-du-loup.wav"/>
+      </p:stSnd>
+    </p:sndAc>
+  </p:transition>
 </p:sldLayout>
 </file>
 
@@ -1611,6 +1624,14 @@
   <p:clrMapOvr>
     <a:masterClrMapping/>
   </p:clrMapOvr>
+  <p:transition spd="slow">
+    <p:push dir="u"/>
+    <p:sndAc>
+      <p:stSnd>
+        <p:snd r:embed="rId1" name="Le-hurlement-du-loup.wav"/>
+      </p:stSnd>
+    </p:sndAc>
+  </p:transition>
 </p:sldLayout>
 </file>
 
@@ -1786,6 +1807,14 @@
   <p:clrMapOvr>
     <a:masterClrMapping/>
   </p:clrMapOvr>
+  <p:transition spd="slow">
+    <p:push dir="u"/>
+    <p:sndAc>
+      <p:stSnd>
+        <p:snd r:embed="rId1" name="Le-hurlement-du-loup.wav"/>
+      </p:stSnd>
+    </p:sndAc>
+  </p:transition>
 </p:sldLayout>
 </file>
 
@@ -1951,6 +1980,14 @@
   <p:clrMapOvr>
     <a:masterClrMapping/>
   </p:clrMapOvr>
+  <p:transition spd="slow">
+    <p:push dir="u"/>
+    <p:sndAc>
+      <p:stSnd>
+        <p:snd r:embed="rId1" name="Le-hurlement-du-loup.wav"/>
+      </p:stSnd>
+    </p:sndAc>
+  </p:transition>
 </p:sldLayout>
 </file>
 
@@ -3193,6 +3230,14 @@
   <p:clrMapOvr>
     <a:overrideClrMapping bg1="dk1" tx1="lt1" bg2="dk2" tx2="lt2" accent1="accent1" accent2="accent2" accent3="accent3" accent4="accent4" accent5="accent5" accent6="accent6" hlink="hlink" folHlink="folHlink"/>
   </p:clrMapOvr>
+  <p:transition spd="slow">
+    <p:push dir="u"/>
+    <p:sndAc>
+      <p:stSnd>
+        <p:snd r:embed="rId1" name="Le-hurlement-du-loup.wav"/>
+      </p:stSnd>
+    </p:sndAc>
+  </p:transition>
 </p:sldLayout>
 </file>
 
@@ -3420,6 +3465,14 @@
   <p:clrMapOvr>
     <a:masterClrMapping/>
   </p:clrMapOvr>
+  <p:transition spd="slow">
+    <p:push dir="u"/>
+    <p:sndAc>
+      <p:stSnd>
+        <p:snd r:embed="rId1" name="Le-hurlement-du-loup.wav"/>
+      </p:stSnd>
+    </p:sndAc>
+  </p:transition>
   <p:extLst mod="1">
     <p:ext uri="{DCECCB84-F9BA-43D5-87BE-67443E8EF086}">
       <p15:sldGuideLst xmlns:p15="http://schemas.microsoft.com/office/powerpoint/2012/main"/>
@@ -3805,6 +3858,14 @@
   <p:clrMapOvr>
     <a:masterClrMapping/>
   </p:clrMapOvr>
+  <p:transition spd="slow">
+    <p:push dir="u"/>
+    <p:sndAc>
+      <p:stSnd>
+        <p:snd r:embed="rId1" name="Le-hurlement-du-loup.wav"/>
+      </p:stSnd>
+    </p:sndAc>
+  </p:transition>
   <p:extLst mod="1">
     <p:ext uri="{DCECCB84-F9BA-43D5-87BE-67443E8EF086}">
       <p15:sldGuideLst xmlns:p15="http://schemas.microsoft.com/office/powerpoint/2012/main"/>
@@ -3923,6 +3984,14 @@
   <p:clrMapOvr>
     <a:masterClrMapping/>
   </p:clrMapOvr>
+  <p:transition spd="slow">
+    <p:push dir="u"/>
+    <p:sndAc>
+      <p:stSnd>
+        <p:snd r:embed="rId1" name="Le-hurlement-du-loup.wav"/>
+      </p:stSnd>
+    </p:sndAc>
+  </p:transition>
 </p:sldLayout>
 </file>
 
@@ -4013,6 +4082,14 @@
   <p:clrMapOvr>
     <a:masterClrMapping/>
   </p:clrMapOvr>
+  <p:transition spd="slow">
+    <p:push dir="u"/>
+    <p:sndAc>
+      <p:stSnd>
+        <p:snd r:embed="rId1" name="Le-hurlement-du-loup.wav"/>
+      </p:stSnd>
+    </p:sndAc>
+  </p:transition>
 </p:sldLayout>
 </file>
 
@@ -4819,6 +4896,14 @@
   <p:clrMapOvr>
     <a:masterClrMapping/>
   </p:clrMapOvr>
+  <p:transition spd="slow">
+    <p:push dir="u"/>
+    <p:sndAc>
+      <p:stSnd>
+        <p:snd r:embed="rId1" name="Le-hurlement-du-loup.wav"/>
+      </p:stSnd>
+    </p:sndAc>
+  </p:transition>
   <p:extLst mod="1">
     <p:ext uri="{DCECCB84-F9BA-43D5-87BE-67443E8EF086}">
       <p15:sldGuideLst xmlns:p15="http://schemas.microsoft.com/office/powerpoint/2012/main">
@@ -5616,6 +5701,14 @@
   <p:clrMapOvr>
     <a:masterClrMapping/>
   </p:clrMapOvr>
+  <p:transition spd="slow">
+    <p:push dir="u"/>
+    <p:sndAc>
+      <p:stSnd>
+        <p:snd r:embed="rId1" name="Le-hurlement-du-loup.wav"/>
+      </p:stSnd>
+    </p:sndAc>
+  </p:transition>
 </p:sldLayout>
 </file>
 
@@ -6381,6 +6474,14 @@
     <p:sldLayoutId id="2147483658" r:id="rId10"/>
     <p:sldLayoutId id="2147483659" r:id="rId11"/>
   </p:sldLayoutIdLst>
+  <p:transition spd="slow">
+    <p:push dir="u"/>
+    <p:sndAc>
+      <p:stSnd>
+        <p:snd r:embed="rId13" name="Le-hurlement-du-loup.wav"/>
+      </p:stSnd>
+    </p:sndAc>
+  </p:transition>
   <p:txStyles>
     <p:titleStyle>
       <a:lvl1pPr algn="l" defTabSz="914400" rtl="0" eaLnBrk="1" latinLnBrk="0" hangingPunct="1">
@@ -6834,6 +6935,14 @@
   <p:clrMapOvr>
     <a:masterClrMapping/>
   </p:clrMapOvr>
+  <mc:AlternateContent xmlns:mc="http://schemas.openxmlformats.org/markup-compatibility/2006">
+    <mc:Choice xmlns:p14="http://schemas.microsoft.com/office/powerpoint/2010/main" Requires="p14">
+      <p:transition p14:dur="0"/>
+    </mc:Choice>
+    <mc:Fallback>
+      <p:transition/>
+    </mc:Fallback>
+  </mc:AlternateContent>
   <p:timing>
     <p:tnLst>
       <p:par>
@@ -6920,13 +7029,30 @@
             </a:r>
             <a:r>
               <a:rPr lang="fr-FR" dirty="0" smtClean="0"/>
-              <a:t> doivent tuer les villageois</a:t>
-            </a:r>
-          </a:p>
-          <a:p>
+              <a:t> doivent tuer les </a:t>
+            </a:r>
             <a:r>
               <a:rPr lang="fr-FR" dirty="0" smtClean="0"/>
-              <a:t>Les villageois doivent tuer les </a:t>
+              <a:t>innocents</a:t>
+            </a:r>
+            <a:endParaRPr lang="fr-FR" dirty="0" smtClean="0"/>
+          </a:p>
+          <a:p>
+            <a:r>
+              <a:rPr lang="fr-FR" dirty="0" smtClean="0"/>
+              <a:t>Les </a:t>
+            </a:r>
+            <a:r>
+              <a:rPr lang="fr-FR" dirty="0" smtClean="0"/>
+              <a:t>innocents</a:t>
+            </a:r>
+            <a:r>
+              <a:rPr lang="fr-FR" dirty="0" smtClean="0"/>
+              <a:t> </a:t>
+            </a:r>
+            <a:r>
+              <a:rPr lang="fr-FR" dirty="0" smtClean="0"/>
+              <a:t>doivent tuer les </a:t>
             </a:r>
             <a:r>
               <a:rPr lang="fr-FR" dirty="0" err="1" smtClean="0"/>
@@ -6969,7 +7095,7 @@
           <p:nvPr/>
         </p:nvPicPr>
         <p:blipFill>
-          <a:blip r:embed="rId2">
+          <a:blip r:embed="rId3">
             <a:extLst>
               <a:ext uri="{28A0092B-C50C-407E-A947-70E740481C1C}">
                 <a14:useLocalDpi xmlns:a14="http://schemas.microsoft.com/office/drawing/2010/main" val="0"/>
@@ -7000,6 +7126,14 @@
   <p:clrMapOvr>
     <a:masterClrMapping/>
   </p:clrMapOvr>
+  <p:transition spd="slow">
+    <p:push dir="u"/>
+    <p:sndAc>
+      <p:stSnd>
+        <p:snd r:embed="rId2" name="Le-hurlement-du-loup.wav"/>
+      </p:stSnd>
+    </p:sndAc>
+  </p:transition>
   <p:timing>
     <p:tnLst>
       <p:par>
@@ -7117,15 +7251,33 @@
                                   </p:childTnLst>
                                 </p:cTn>
                               </p:par>
+                            </p:childTnLst>
+                          </p:cTn>
+                        </p:par>
+                      </p:childTnLst>
+                    </p:cTn>
+                  </p:par>
+                  <p:par>
+                    <p:cTn id="10" fill="hold">
+                      <p:stCondLst>
+                        <p:cond delay="indefinite"/>
+                      </p:stCondLst>
+                      <p:childTnLst>
+                        <p:par>
+                          <p:cTn id="11" fill="hold">
+                            <p:stCondLst>
+                              <p:cond delay="0"/>
+                            </p:stCondLst>
+                            <p:childTnLst>
                               <p:par>
-                                <p:cTn id="10" presetID="53" presetClass="entr" presetSubtype="16" fill="hold" nodeType="withEffect">
+                                <p:cTn id="12" presetID="53" presetClass="entr" presetSubtype="16" fill="hold" nodeType="clickEffect">
                                   <p:stCondLst>
                                     <p:cond delay="0"/>
                                   </p:stCondLst>
                                   <p:childTnLst>
                                     <p:set>
                                       <p:cBhvr>
-                                        <p:cTn id="11" dur="1" fill="hold">
+                                        <p:cTn id="13" dur="1" fill="hold">
                                           <p:stCondLst>
                                             <p:cond delay="0"/>
                                           </p:stCondLst>
@@ -7147,7 +7299,7 @@
                                     </p:set>
                                     <p:anim calcmode="lin" valueType="num">
                                       <p:cBhvr>
-                                        <p:cTn id="12" dur="500" fill="hold"/>
+                                        <p:cTn id="14" dur="500" fill="hold"/>
                                         <p:tgtEl>
                                           <p:spTgt spid="3">
                                             <p:txEl>
@@ -7174,7 +7326,7 @@
                                     </p:anim>
                                     <p:anim calcmode="lin" valueType="num">
                                       <p:cBhvr>
-                                        <p:cTn id="13" dur="500" fill="hold"/>
+                                        <p:cTn id="15" dur="500" fill="hold"/>
                                         <p:tgtEl>
                                           <p:spTgt spid="3">
                                             <p:txEl>
@@ -7201,7 +7353,7 @@
                                     </p:anim>
                                     <p:animEffect transition="in" filter="fade">
                                       <p:cBhvr>
-                                        <p:cTn id="14" dur="500"/>
+                                        <p:cTn id="16" dur="500"/>
                                         <p:tgtEl>
                                           <p:spTgt spid="3">
                                             <p:txEl>
@@ -7214,15 +7366,33 @@
                                   </p:childTnLst>
                                 </p:cTn>
                               </p:par>
+                            </p:childTnLst>
+                          </p:cTn>
+                        </p:par>
+                      </p:childTnLst>
+                    </p:cTn>
+                  </p:par>
+                  <p:par>
+                    <p:cTn id="17" fill="hold">
+                      <p:stCondLst>
+                        <p:cond delay="indefinite"/>
+                      </p:stCondLst>
+                      <p:childTnLst>
+                        <p:par>
+                          <p:cTn id="18" fill="hold">
+                            <p:stCondLst>
+                              <p:cond delay="0"/>
+                            </p:stCondLst>
+                            <p:childTnLst>
                               <p:par>
-                                <p:cTn id="15" presetID="53" presetClass="entr" presetSubtype="16" fill="hold" nodeType="withEffect">
+                                <p:cTn id="19" presetID="53" presetClass="entr" presetSubtype="16" fill="hold" nodeType="clickEffect">
                                   <p:stCondLst>
                                     <p:cond delay="0"/>
                                   </p:stCondLst>
                                   <p:childTnLst>
                                     <p:set>
                                       <p:cBhvr>
-                                        <p:cTn id="16" dur="1" fill="hold">
+                                        <p:cTn id="20" dur="1" fill="hold">
                                           <p:stCondLst>
                                             <p:cond delay="0"/>
                                           </p:stCondLst>
@@ -7244,7 +7414,7 @@
                                     </p:set>
                                     <p:anim calcmode="lin" valueType="num">
                                       <p:cBhvr>
-                                        <p:cTn id="17" dur="500" fill="hold"/>
+                                        <p:cTn id="21" dur="500" fill="hold"/>
                                         <p:tgtEl>
                                           <p:spTgt spid="3">
                                             <p:txEl>
@@ -7271,7 +7441,7 @@
                                     </p:anim>
                                     <p:anim calcmode="lin" valueType="num">
                                       <p:cBhvr>
-                                        <p:cTn id="18" dur="500" fill="hold"/>
+                                        <p:cTn id="22" dur="500" fill="hold"/>
                                         <p:tgtEl>
                                           <p:spTgt spid="3">
                                             <p:txEl>
@@ -7298,7 +7468,7 @@
                                     </p:anim>
                                     <p:animEffect transition="in" filter="fade">
                                       <p:cBhvr>
-                                        <p:cTn id="19" dur="500"/>
+                                        <p:cTn id="23" dur="500"/>
                                         <p:tgtEl>
                                           <p:spTgt spid="3">
                                             <p:txEl>
@@ -7311,15 +7481,33 @@
                                   </p:childTnLst>
                                 </p:cTn>
                               </p:par>
+                            </p:childTnLst>
+                          </p:cTn>
+                        </p:par>
+                      </p:childTnLst>
+                    </p:cTn>
+                  </p:par>
+                  <p:par>
+                    <p:cTn id="24" fill="hold">
+                      <p:stCondLst>
+                        <p:cond delay="indefinite"/>
+                      </p:stCondLst>
+                      <p:childTnLst>
+                        <p:par>
+                          <p:cTn id="25" fill="hold">
+                            <p:stCondLst>
+                              <p:cond delay="0"/>
+                            </p:stCondLst>
+                            <p:childTnLst>
                               <p:par>
-                                <p:cTn id="20" presetID="53" presetClass="entr" presetSubtype="16" fill="hold" nodeType="withEffect">
+                                <p:cTn id="26" presetID="53" presetClass="entr" presetSubtype="16" fill="hold" nodeType="clickEffect">
                                   <p:stCondLst>
                                     <p:cond delay="0"/>
                                   </p:stCondLst>
                                   <p:childTnLst>
                                     <p:set>
                                       <p:cBhvr>
-                                        <p:cTn id="21" dur="1" fill="hold">
+                                        <p:cTn id="27" dur="1" fill="hold">
                                           <p:stCondLst>
                                             <p:cond delay="0"/>
                                           </p:stCondLst>
@@ -7341,7 +7529,7 @@
                                     </p:set>
                                     <p:anim calcmode="lin" valueType="num">
                                       <p:cBhvr>
-                                        <p:cTn id="22" dur="500" fill="hold"/>
+                                        <p:cTn id="28" dur="500" fill="hold"/>
                                         <p:tgtEl>
                                           <p:spTgt spid="3">
                                             <p:txEl>
@@ -7368,7 +7556,7 @@
                                     </p:anim>
                                     <p:anim calcmode="lin" valueType="num">
                                       <p:cBhvr>
-                                        <p:cTn id="23" dur="500" fill="hold"/>
+                                        <p:cTn id="29" dur="500" fill="hold"/>
                                         <p:tgtEl>
                                           <p:spTgt spid="3">
                                             <p:txEl>
@@ -7395,7 +7583,7 @@
                                     </p:anim>
                                     <p:animEffect transition="in" filter="fade">
                                       <p:cBhvr>
-                                        <p:cTn id="24" dur="500"/>
+                                        <p:cTn id="30" dur="500"/>
                                         <p:tgtEl>
                                           <p:spTgt spid="3">
                                             <p:txEl>
@@ -7408,15 +7596,33 @@
                                   </p:childTnLst>
                                 </p:cTn>
                               </p:par>
+                            </p:childTnLst>
+                          </p:cTn>
+                        </p:par>
+                      </p:childTnLst>
+                    </p:cTn>
+                  </p:par>
+                  <p:par>
+                    <p:cTn id="31" fill="hold">
+                      <p:stCondLst>
+                        <p:cond delay="indefinite"/>
+                      </p:stCondLst>
+                      <p:childTnLst>
+                        <p:par>
+                          <p:cTn id="32" fill="hold">
+                            <p:stCondLst>
+                              <p:cond delay="0"/>
+                            </p:stCondLst>
+                            <p:childTnLst>
                               <p:par>
-                                <p:cTn id="25" presetID="53" presetClass="entr" presetSubtype="16" fill="hold" nodeType="withEffect">
+                                <p:cTn id="33" presetID="53" presetClass="entr" presetSubtype="16" fill="hold" nodeType="clickEffect">
                                   <p:stCondLst>
                                     <p:cond delay="0"/>
                                   </p:stCondLst>
                                   <p:childTnLst>
                                     <p:set>
                                       <p:cBhvr>
-                                        <p:cTn id="26" dur="1" fill="hold">
+                                        <p:cTn id="34" dur="1" fill="hold">
                                           <p:stCondLst>
                                             <p:cond delay="0"/>
                                           </p:stCondLst>
@@ -7438,7 +7644,7 @@
                                     </p:set>
                                     <p:anim calcmode="lin" valueType="num">
                                       <p:cBhvr>
-                                        <p:cTn id="27" dur="500" fill="hold"/>
+                                        <p:cTn id="35" dur="500" fill="hold"/>
                                         <p:tgtEl>
                                           <p:spTgt spid="3">
                                             <p:txEl>
@@ -7465,7 +7671,7 @@
                                     </p:anim>
                                     <p:anim calcmode="lin" valueType="num">
                                       <p:cBhvr>
-                                        <p:cTn id="28" dur="500" fill="hold"/>
+                                        <p:cTn id="36" dur="500" fill="hold"/>
                                         <p:tgtEl>
                                           <p:spTgt spid="3">
                                             <p:txEl>
@@ -7492,7 +7698,7 @@
                                     </p:anim>
                                     <p:animEffect transition="in" filter="fade">
                                       <p:cBhvr>
-                                        <p:cTn id="29" dur="500"/>
+                                        <p:cTn id="37" dur="500"/>
                                         <p:tgtEl>
                                           <p:spTgt spid="3">
                                             <p:txEl>
@@ -7505,15 +7711,33 @@
                                   </p:childTnLst>
                                 </p:cTn>
                               </p:par>
+                            </p:childTnLst>
+                          </p:cTn>
+                        </p:par>
+                      </p:childTnLst>
+                    </p:cTn>
+                  </p:par>
+                  <p:par>
+                    <p:cTn id="38" fill="hold">
+                      <p:stCondLst>
+                        <p:cond delay="indefinite"/>
+                      </p:stCondLst>
+                      <p:childTnLst>
+                        <p:par>
+                          <p:cTn id="39" fill="hold">
+                            <p:stCondLst>
+                              <p:cond delay="0"/>
+                            </p:stCondLst>
+                            <p:childTnLst>
                               <p:par>
-                                <p:cTn id="30" presetID="53" presetClass="entr" presetSubtype="16" fill="hold" nodeType="withEffect">
+                                <p:cTn id="40" presetID="53" presetClass="entr" presetSubtype="16" fill="hold" nodeType="clickEffect">
                                   <p:stCondLst>
                                     <p:cond delay="0"/>
                                   </p:stCondLst>
                                   <p:childTnLst>
                                     <p:set>
                                       <p:cBhvr>
-                                        <p:cTn id="31" dur="1" fill="hold">
+                                        <p:cTn id="41" dur="1" fill="hold">
                                           <p:stCondLst>
                                             <p:cond delay="0"/>
                                           </p:stCondLst>
@@ -7535,7 +7759,7 @@
                                     </p:set>
                                     <p:anim calcmode="lin" valueType="num">
                                       <p:cBhvr>
-                                        <p:cTn id="32" dur="500" fill="hold"/>
+                                        <p:cTn id="42" dur="500" fill="hold"/>
                                         <p:tgtEl>
                                           <p:spTgt spid="3">
                                             <p:txEl>
@@ -7562,7 +7786,7 @@
                                     </p:anim>
                                     <p:anim calcmode="lin" valueType="num">
                                       <p:cBhvr>
-                                        <p:cTn id="33" dur="500" fill="hold"/>
+                                        <p:cTn id="43" dur="500" fill="hold"/>
                                         <p:tgtEl>
                                           <p:spTgt spid="3">
                                             <p:txEl>
@@ -7589,7 +7813,7 @@
                                     </p:anim>
                                     <p:animEffect transition="in" filter="fade">
                                       <p:cBhvr>
-                                        <p:cTn id="34" dur="500"/>
+                                        <p:cTn id="44" dur="500"/>
                                         <p:tgtEl>
                                           <p:spTgt spid="3">
                                             <p:txEl>
@@ -7602,15 +7826,33 @@
                                   </p:childTnLst>
                                 </p:cTn>
                               </p:par>
+                            </p:childTnLst>
+                          </p:cTn>
+                        </p:par>
+                      </p:childTnLst>
+                    </p:cTn>
+                  </p:par>
+                  <p:par>
+                    <p:cTn id="45" fill="hold">
+                      <p:stCondLst>
+                        <p:cond delay="indefinite"/>
+                      </p:stCondLst>
+                      <p:childTnLst>
+                        <p:par>
+                          <p:cTn id="46" fill="hold">
+                            <p:stCondLst>
+                              <p:cond delay="0"/>
+                            </p:stCondLst>
+                            <p:childTnLst>
                               <p:par>
-                                <p:cTn id="35" presetID="53" presetClass="entr" presetSubtype="16" fill="hold" nodeType="withEffect">
+                                <p:cTn id="47" presetID="53" presetClass="entr" presetSubtype="16" fill="hold" nodeType="clickEffect">
                                   <p:stCondLst>
                                     <p:cond delay="0"/>
                                   </p:stCondLst>
                                   <p:childTnLst>
                                     <p:set>
                                       <p:cBhvr>
-                                        <p:cTn id="36" dur="1" fill="hold">
+                                        <p:cTn id="48" dur="1" fill="hold">
                                           <p:stCondLst>
                                             <p:cond delay="0"/>
                                           </p:stCondLst>
@@ -7632,7 +7874,7 @@
                                     </p:set>
                                     <p:anim calcmode="lin" valueType="num">
                                       <p:cBhvr>
-                                        <p:cTn id="37" dur="500" fill="hold"/>
+                                        <p:cTn id="49" dur="500" fill="hold"/>
                                         <p:tgtEl>
                                           <p:spTgt spid="3">
                                             <p:txEl>
@@ -7659,7 +7901,7 @@
                                     </p:anim>
                                     <p:anim calcmode="lin" valueType="num">
                                       <p:cBhvr>
-                                        <p:cTn id="38" dur="500" fill="hold"/>
+                                        <p:cTn id="50" dur="500" fill="hold"/>
                                         <p:tgtEl>
                                           <p:spTgt spid="3">
                                             <p:txEl>
@@ -7686,7 +7928,7 @@
                                     </p:anim>
                                     <p:animEffect transition="in" filter="fade">
                                       <p:cBhvr>
-                                        <p:cTn id="39" dur="500"/>
+                                        <p:cTn id="51" dur="500"/>
                                         <p:tgtEl>
                                           <p:spTgt spid="3">
                                             <p:txEl>
@@ -7823,6 +8065,14 @@
   <p:clrMapOvr>
     <a:masterClrMapping/>
   </p:clrMapOvr>
+  <p:transition spd="slow">
+    <p:push dir="u"/>
+    <p:sndAc>
+      <p:stSnd>
+        <p:snd r:embed="rId2" name="Le-hurlement-du-loup.wav"/>
+      </p:stSnd>
+    </p:sndAc>
+  </p:transition>
   <p:timing>
     <p:tnLst>
       <p:par>
@@ -7903,6 +8153,14 @@
   <p:clrMapOvr>
     <a:masterClrMapping/>
   </p:clrMapOvr>
+  <p:transition spd="slow">
+    <p:push dir="u"/>
+    <p:sndAc>
+      <p:stSnd>
+        <p:snd r:embed="rId2" name="Le-hurlement-du-loup.wav"/>
+      </p:stSnd>
+    </p:sndAc>
+  </p:transition>
   <p:timing>
     <p:tnLst>
       <p:par>
@@ -7964,7 +8222,12 @@
             <p:ph idx="1"/>
           </p:nvPr>
         </p:nvSpPr>
-        <p:spPr/>
+        <p:spPr>
+          <a:xfrm>
+            <a:off x="1251678" y="2712721"/>
+            <a:ext cx="10178322" cy="3593591"/>
+          </a:xfrm>
+        </p:spPr>
         <p:txBody>
           <a:bodyPr/>
           <a:lstStyle/>
@@ -7983,7 +8246,15 @@
           <a:p>
             <a:r>
               <a:rPr lang="fr-FR" dirty="0" smtClean="0"/>
-              <a:t>Rajouter description des rôles</a:t>
+              <a:t>Rajouter </a:t>
+            </a:r>
+            <a:r>
+              <a:rPr lang="fr-FR" dirty="0" smtClean="0"/>
+              <a:t>la description </a:t>
+            </a:r>
+            <a:r>
+              <a:rPr lang="fr-FR" dirty="0" smtClean="0"/>
+              <a:t>des rôles</a:t>
             </a:r>
           </a:p>
           <a:p>
@@ -8013,6 +8284,36 @@
           </a:p>
         </p:txBody>
       </p:sp>
+      <p:pic>
+        <p:nvPicPr>
+          <p:cNvPr id="5" name="Image 4"/>
+          <p:cNvPicPr>
+            <a:picLocks noChangeAspect="1"/>
+          </p:cNvPicPr>
+          <p:nvPr/>
+        </p:nvPicPr>
+        <p:blipFill>
+          <a:blip r:embed="rId3">
+            <a:extLst>
+              <a:ext uri="{28A0092B-C50C-407E-A947-70E740481C1C}">
+                <a14:useLocalDpi xmlns:a14="http://schemas.microsoft.com/office/drawing/2010/main" val="0"/>
+              </a:ext>
+            </a:extLst>
+          </a:blip>
+          <a:stretch>
+            <a:fillRect/>
+          </a:stretch>
+        </p:blipFill>
+        <p:spPr>
+          <a:xfrm>
+            <a:off x="6966858" y="696912"/>
+            <a:ext cx="4232366" cy="2146726"/>
+          </a:xfrm>
+          <a:prstGeom prst="rect">
+            <a:avLst/>
+          </a:prstGeom>
+        </p:spPr>
+      </p:pic>
     </p:spTree>
     <p:extLst>
       <p:ext uri="{BB962C8B-B14F-4D97-AF65-F5344CB8AC3E}">
@@ -8023,10 +8324,731 @@
   <p:clrMapOvr>
     <a:masterClrMapping/>
   </p:clrMapOvr>
+  <p:transition spd="slow">
+    <p:push dir="u"/>
+    <p:sndAc>
+      <p:stSnd>
+        <p:snd r:embed="rId2" name="Le-hurlement-du-loup.wav"/>
+      </p:stSnd>
+    </p:sndAc>
+  </p:transition>
   <p:timing>
     <p:tnLst>
       <p:par>
-        <p:cTn id="1" dur="indefinite" restart="never" nodeType="tmRoot"/>
+        <p:cTn id="1" dur="indefinite" restart="never" nodeType="tmRoot">
+          <p:childTnLst>
+            <p:seq concurrent="1" nextAc="seek">
+              <p:cTn id="2" dur="indefinite" nodeType="mainSeq">
+                <p:childTnLst>
+                  <p:par>
+                    <p:cTn id="3" fill="hold">
+                      <p:stCondLst>
+                        <p:cond delay="indefinite"/>
+                      </p:stCondLst>
+                      <p:childTnLst>
+                        <p:par>
+                          <p:cTn id="4" fill="hold">
+                            <p:stCondLst>
+                              <p:cond delay="0"/>
+                            </p:stCondLst>
+                            <p:childTnLst>
+                              <p:par>
+                                <p:cTn id="5" presetID="53" presetClass="entr" presetSubtype="16" fill="hold" nodeType="clickEffect">
+                                  <p:stCondLst>
+                                    <p:cond delay="0"/>
+                                  </p:stCondLst>
+                                  <p:childTnLst>
+                                    <p:set>
+                                      <p:cBhvr>
+                                        <p:cTn id="6" dur="1" fill="hold">
+                                          <p:stCondLst>
+                                            <p:cond delay="0"/>
+                                          </p:stCondLst>
+                                        </p:cTn>
+                                        <p:tgtEl>
+                                          <p:spTgt spid="3">
+                                            <p:txEl>
+                                              <p:pRg st="1" end="1"/>
+                                            </p:txEl>
+                                          </p:spTgt>
+                                        </p:tgtEl>
+                                        <p:attrNameLst>
+                                          <p:attrName>style.visibility</p:attrName>
+                                        </p:attrNameLst>
+                                      </p:cBhvr>
+                                      <p:to>
+                                        <p:strVal val="visible"/>
+                                      </p:to>
+                                    </p:set>
+                                    <p:anim calcmode="lin" valueType="num">
+                                      <p:cBhvr>
+                                        <p:cTn id="7" dur="500" fill="hold"/>
+                                        <p:tgtEl>
+                                          <p:spTgt spid="3">
+                                            <p:txEl>
+                                              <p:pRg st="1" end="1"/>
+                                            </p:txEl>
+                                          </p:spTgt>
+                                        </p:tgtEl>
+                                        <p:attrNameLst>
+                                          <p:attrName>ppt_w</p:attrName>
+                                        </p:attrNameLst>
+                                      </p:cBhvr>
+                                      <p:tavLst>
+                                        <p:tav tm="0">
+                                          <p:val>
+                                            <p:fltVal val="0"/>
+                                          </p:val>
+                                        </p:tav>
+                                        <p:tav tm="100000">
+                                          <p:val>
+                                            <p:strVal val="#ppt_w"/>
+                                          </p:val>
+                                        </p:tav>
+                                      </p:tavLst>
+                                    </p:anim>
+                                    <p:anim calcmode="lin" valueType="num">
+                                      <p:cBhvr>
+                                        <p:cTn id="8" dur="500" fill="hold"/>
+                                        <p:tgtEl>
+                                          <p:spTgt spid="3">
+                                            <p:txEl>
+                                              <p:pRg st="1" end="1"/>
+                                            </p:txEl>
+                                          </p:spTgt>
+                                        </p:tgtEl>
+                                        <p:attrNameLst>
+                                          <p:attrName>ppt_h</p:attrName>
+                                        </p:attrNameLst>
+                                      </p:cBhvr>
+                                      <p:tavLst>
+                                        <p:tav tm="0">
+                                          <p:val>
+                                            <p:fltVal val="0"/>
+                                          </p:val>
+                                        </p:tav>
+                                        <p:tav tm="100000">
+                                          <p:val>
+                                            <p:strVal val="#ppt_h"/>
+                                          </p:val>
+                                        </p:tav>
+                                      </p:tavLst>
+                                    </p:anim>
+                                    <p:animEffect transition="in" filter="fade">
+                                      <p:cBhvr>
+                                        <p:cTn id="9" dur="500"/>
+                                        <p:tgtEl>
+                                          <p:spTgt spid="3">
+                                            <p:txEl>
+                                              <p:pRg st="1" end="1"/>
+                                            </p:txEl>
+                                          </p:spTgt>
+                                        </p:tgtEl>
+                                      </p:cBhvr>
+                                    </p:animEffect>
+                                  </p:childTnLst>
+                                </p:cTn>
+                              </p:par>
+                            </p:childTnLst>
+                          </p:cTn>
+                        </p:par>
+                      </p:childTnLst>
+                    </p:cTn>
+                  </p:par>
+                  <p:par>
+                    <p:cTn id="10" fill="hold">
+                      <p:stCondLst>
+                        <p:cond delay="indefinite"/>
+                      </p:stCondLst>
+                      <p:childTnLst>
+                        <p:par>
+                          <p:cTn id="11" fill="hold">
+                            <p:stCondLst>
+                              <p:cond delay="0"/>
+                            </p:stCondLst>
+                            <p:childTnLst>
+                              <p:par>
+                                <p:cTn id="12" presetID="53" presetClass="entr" presetSubtype="16" fill="hold" nodeType="clickEffect">
+                                  <p:stCondLst>
+                                    <p:cond delay="0"/>
+                                  </p:stCondLst>
+                                  <p:childTnLst>
+                                    <p:set>
+                                      <p:cBhvr>
+                                        <p:cTn id="13" dur="1" fill="hold">
+                                          <p:stCondLst>
+                                            <p:cond delay="0"/>
+                                          </p:stCondLst>
+                                        </p:cTn>
+                                        <p:tgtEl>
+                                          <p:spTgt spid="3">
+                                            <p:txEl>
+                                              <p:pRg st="2" end="2"/>
+                                            </p:txEl>
+                                          </p:spTgt>
+                                        </p:tgtEl>
+                                        <p:attrNameLst>
+                                          <p:attrName>style.visibility</p:attrName>
+                                        </p:attrNameLst>
+                                      </p:cBhvr>
+                                      <p:to>
+                                        <p:strVal val="visible"/>
+                                      </p:to>
+                                    </p:set>
+                                    <p:anim calcmode="lin" valueType="num">
+                                      <p:cBhvr>
+                                        <p:cTn id="14" dur="500" fill="hold"/>
+                                        <p:tgtEl>
+                                          <p:spTgt spid="3">
+                                            <p:txEl>
+                                              <p:pRg st="2" end="2"/>
+                                            </p:txEl>
+                                          </p:spTgt>
+                                        </p:tgtEl>
+                                        <p:attrNameLst>
+                                          <p:attrName>ppt_w</p:attrName>
+                                        </p:attrNameLst>
+                                      </p:cBhvr>
+                                      <p:tavLst>
+                                        <p:tav tm="0">
+                                          <p:val>
+                                            <p:fltVal val="0"/>
+                                          </p:val>
+                                        </p:tav>
+                                        <p:tav tm="100000">
+                                          <p:val>
+                                            <p:strVal val="#ppt_w"/>
+                                          </p:val>
+                                        </p:tav>
+                                      </p:tavLst>
+                                    </p:anim>
+                                    <p:anim calcmode="lin" valueType="num">
+                                      <p:cBhvr>
+                                        <p:cTn id="15" dur="500" fill="hold"/>
+                                        <p:tgtEl>
+                                          <p:spTgt spid="3">
+                                            <p:txEl>
+                                              <p:pRg st="2" end="2"/>
+                                            </p:txEl>
+                                          </p:spTgt>
+                                        </p:tgtEl>
+                                        <p:attrNameLst>
+                                          <p:attrName>ppt_h</p:attrName>
+                                        </p:attrNameLst>
+                                      </p:cBhvr>
+                                      <p:tavLst>
+                                        <p:tav tm="0">
+                                          <p:val>
+                                            <p:fltVal val="0"/>
+                                          </p:val>
+                                        </p:tav>
+                                        <p:tav tm="100000">
+                                          <p:val>
+                                            <p:strVal val="#ppt_h"/>
+                                          </p:val>
+                                        </p:tav>
+                                      </p:tavLst>
+                                    </p:anim>
+                                    <p:animEffect transition="in" filter="fade">
+                                      <p:cBhvr>
+                                        <p:cTn id="16" dur="500"/>
+                                        <p:tgtEl>
+                                          <p:spTgt spid="3">
+                                            <p:txEl>
+                                              <p:pRg st="2" end="2"/>
+                                            </p:txEl>
+                                          </p:spTgt>
+                                        </p:tgtEl>
+                                      </p:cBhvr>
+                                    </p:animEffect>
+                                  </p:childTnLst>
+                                </p:cTn>
+                              </p:par>
+                            </p:childTnLst>
+                          </p:cTn>
+                        </p:par>
+                      </p:childTnLst>
+                    </p:cTn>
+                  </p:par>
+                  <p:par>
+                    <p:cTn id="17" fill="hold">
+                      <p:stCondLst>
+                        <p:cond delay="indefinite"/>
+                      </p:stCondLst>
+                      <p:childTnLst>
+                        <p:par>
+                          <p:cTn id="18" fill="hold">
+                            <p:stCondLst>
+                              <p:cond delay="0"/>
+                            </p:stCondLst>
+                            <p:childTnLst>
+                              <p:par>
+                                <p:cTn id="19" presetID="53" presetClass="entr" presetSubtype="16" fill="hold" nodeType="clickEffect">
+                                  <p:stCondLst>
+                                    <p:cond delay="0"/>
+                                  </p:stCondLst>
+                                  <p:childTnLst>
+                                    <p:set>
+                                      <p:cBhvr>
+                                        <p:cTn id="20" dur="1" fill="hold">
+                                          <p:stCondLst>
+                                            <p:cond delay="0"/>
+                                          </p:stCondLst>
+                                        </p:cTn>
+                                        <p:tgtEl>
+                                          <p:spTgt spid="3">
+                                            <p:txEl>
+                                              <p:pRg st="3" end="3"/>
+                                            </p:txEl>
+                                          </p:spTgt>
+                                        </p:tgtEl>
+                                        <p:attrNameLst>
+                                          <p:attrName>style.visibility</p:attrName>
+                                        </p:attrNameLst>
+                                      </p:cBhvr>
+                                      <p:to>
+                                        <p:strVal val="visible"/>
+                                      </p:to>
+                                    </p:set>
+                                    <p:anim calcmode="lin" valueType="num">
+                                      <p:cBhvr>
+                                        <p:cTn id="21" dur="500" fill="hold"/>
+                                        <p:tgtEl>
+                                          <p:spTgt spid="3">
+                                            <p:txEl>
+                                              <p:pRg st="3" end="3"/>
+                                            </p:txEl>
+                                          </p:spTgt>
+                                        </p:tgtEl>
+                                        <p:attrNameLst>
+                                          <p:attrName>ppt_w</p:attrName>
+                                        </p:attrNameLst>
+                                      </p:cBhvr>
+                                      <p:tavLst>
+                                        <p:tav tm="0">
+                                          <p:val>
+                                            <p:fltVal val="0"/>
+                                          </p:val>
+                                        </p:tav>
+                                        <p:tav tm="100000">
+                                          <p:val>
+                                            <p:strVal val="#ppt_w"/>
+                                          </p:val>
+                                        </p:tav>
+                                      </p:tavLst>
+                                    </p:anim>
+                                    <p:anim calcmode="lin" valueType="num">
+                                      <p:cBhvr>
+                                        <p:cTn id="22" dur="500" fill="hold"/>
+                                        <p:tgtEl>
+                                          <p:spTgt spid="3">
+                                            <p:txEl>
+                                              <p:pRg st="3" end="3"/>
+                                            </p:txEl>
+                                          </p:spTgt>
+                                        </p:tgtEl>
+                                        <p:attrNameLst>
+                                          <p:attrName>ppt_h</p:attrName>
+                                        </p:attrNameLst>
+                                      </p:cBhvr>
+                                      <p:tavLst>
+                                        <p:tav tm="0">
+                                          <p:val>
+                                            <p:fltVal val="0"/>
+                                          </p:val>
+                                        </p:tav>
+                                        <p:tav tm="100000">
+                                          <p:val>
+                                            <p:strVal val="#ppt_h"/>
+                                          </p:val>
+                                        </p:tav>
+                                      </p:tavLst>
+                                    </p:anim>
+                                    <p:animEffect transition="in" filter="fade">
+                                      <p:cBhvr>
+                                        <p:cTn id="23" dur="500"/>
+                                        <p:tgtEl>
+                                          <p:spTgt spid="3">
+                                            <p:txEl>
+                                              <p:pRg st="3" end="3"/>
+                                            </p:txEl>
+                                          </p:spTgt>
+                                        </p:tgtEl>
+                                      </p:cBhvr>
+                                    </p:animEffect>
+                                  </p:childTnLst>
+                                </p:cTn>
+                              </p:par>
+                            </p:childTnLst>
+                          </p:cTn>
+                        </p:par>
+                      </p:childTnLst>
+                    </p:cTn>
+                  </p:par>
+                  <p:par>
+                    <p:cTn id="24" fill="hold">
+                      <p:stCondLst>
+                        <p:cond delay="indefinite"/>
+                      </p:stCondLst>
+                      <p:childTnLst>
+                        <p:par>
+                          <p:cTn id="25" fill="hold">
+                            <p:stCondLst>
+                              <p:cond delay="0"/>
+                            </p:stCondLst>
+                            <p:childTnLst>
+                              <p:par>
+                                <p:cTn id="26" presetID="53" presetClass="entr" presetSubtype="16" fill="hold" nodeType="clickEffect">
+                                  <p:stCondLst>
+                                    <p:cond delay="0"/>
+                                  </p:stCondLst>
+                                  <p:childTnLst>
+                                    <p:set>
+                                      <p:cBhvr>
+                                        <p:cTn id="27" dur="1" fill="hold">
+                                          <p:stCondLst>
+                                            <p:cond delay="0"/>
+                                          </p:stCondLst>
+                                        </p:cTn>
+                                        <p:tgtEl>
+                                          <p:spTgt spid="3">
+                                            <p:txEl>
+                                              <p:pRg st="4" end="4"/>
+                                            </p:txEl>
+                                          </p:spTgt>
+                                        </p:tgtEl>
+                                        <p:attrNameLst>
+                                          <p:attrName>style.visibility</p:attrName>
+                                        </p:attrNameLst>
+                                      </p:cBhvr>
+                                      <p:to>
+                                        <p:strVal val="visible"/>
+                                      </p:to>
+                                    </p:set>
+                                    <p:anim calcmode="lin" valueType="num">
+                                      <p:cBhvr>
+                                        <p:cTn id="28" dur="500" fill="hold"/>
+                                        <p:tgtEl>
+                                          <p:spTgt spid="3">
+                                            <p:txEl>
+                                              <p:pRg st="4" end="4"/>
+                                            </p:txEl>
+                                          </p:spTgt>
+                                        </p:tgtEl>
+                                        <p:attrNameLst>
+                                          <p:attrName>ppt_w</p:attrName>
+                                        </p:attrNameLst>
+                                      </p:cBhvr>
+                                      <p:tavLst>
+                                        <p:tav tm="0">
+                                          <p:val>
+                                            <p:fltVal val="0"/>
+                                          </p:val>
+                                        </p:tav>
+                                        <p:tav tm="100000">
+                                          <p:val>
+                                            <p:strVal val="#ppt_w"/>
+                                          </p:val>
+                                        </p:tav>
+                                      </p:tavLst>
+                                    </p:anim>
+                                    <p:anim calcmode="lin" valueType="num">
+                                      <p:cBhvr>
+                                        <p:cTn id="29" dur="500" fill="hold"/>
+                                        <p:tgtEl>
+                                          <p:spTgt spid="3">
+                                            <p:txEl>
+                                              <p:pRg st="4" end="4"/>
+                                            </p:txEl>
+                                          </p:spTgt>
+                                        </p:tgtEl>
+                                        <p:attrNameLst>
+                                          <p:attrName>ppt_h</p:attrName>
+                                        </p:attrNameLst>
+                                      </p:cBhvr>
+                                      <p:tavLst>
+                                        <p:tav tm="0">
+                                          <p:val>
+                                            <p:fltVal val="0"/>
+                                          </p:val>
+                                        </p:tav>
+                                        <p:tav tm="100000">
+                                          <p:val>
+                                            <p:strVal val="#ppt_h"/>
+                                          </p:val>
+                                        </p:tav>
+                                      </p:tavLst>
+                                    </p:anim>
+                                    <p:animEffect transition="in" filter="fade">
+                                      <p:cBhvr>
+                                        <p:cTn id="30" dur="500"/>
+                                        <p:tgtEl>
+                                          <p:spTgt spid="3">
+                                            <p:txEl>
+                                              <p:pRg st="4" end="4"/>
+                                            </p:txEl>
+                                          </p:spTgt>
+                                        </p:tgtEl>
+                                      </p:cBhvr>
+                                    </p:animEffect>
+                                  </p:childTnLst>
+                                </p:cTn>
+                              </p:par>
+                            </p:childTnLst>
+                          </p:cTn>
+                        </p:par>
+                      </p:childTnLst>
+                    </p:cTn>
+                  </p:par>
+                  <p:par>
+                    <p:cTn id="31" fill="hold">
+                      <p:stCondLst>
+                        <p:cond delay="indefinite"/>
+                      </p:stCondLst>
+                      <p:childTnLst>
+                        <p:par>
+                          <p:cTn id="32" fill="hold">
+                            <p:stCondLst>
+                              <p:cond delay="0"/>
+                            </p:stCondLst>
+                            <p:childTnLst>
+                              <p:par>
+                                <p:cTn id="33" presetID="53" presetClass="entr" presetSubtype="16" fill="hold" nodeType="clickEffect">
+                                  <p:stCondLst>
+                                    <p:cond delay="0"/>
+                                  </p:stCondLst>
+                                  <p:childTnLst>
+                                    <p:set>
+                                      <p:cBhvr>
+                                        <p:cTn id="34" dur="1" fill="hold">
+                                          <p:stCondLst>
+                                            <p:cond delay="0"/>
+                                          </p:stCondLst>
+                                        </p:cTn>
+                                        <p:tgtEl>
+                                          <p:spTgt spid="3">
+                                            <p:txEl>
+                                              <p:pRg st="5" end="5"/>
+                                            </p:txEl>
+                                          </p:spTgt>
+                                        </p:tgtEl>
+                                        <p:attrNameLst>
+                                          <p:attrName>style.visibility</p:attrName>
+                                        </p:attrNameLst>
+                                      </p:cBhvr>
+                                      <p:to>
+                                        <p:strVal val="visible"/>
+                                      </p:to>
+                                    </p:set>
+                                    <p:anim calcmode="lin" valueType="num">
+                                      <p:cBhvr>
+                                        <p:cTn id="35" dur="500" fill="hold"/>
+                                        <p:tgtEl>
+                                          <p:spTgt spid="3">
+                                            <p:txEl>
+                                              <p:pRg st="5" end="5"/>
+                                            </p:txEl>
+                                          </p:spTgt>
+                                        </p:tgtEl>
+                                        <p:attrNameLst>
+                                          <p:attrName>ppt_w</p:attrName>
+                                        </p:attrNameLst>
+                                      </p:cBhvr>
+                                      <p:tavLst>
+                                        <p:tav tm="0">
+                                          <p:val>
+                                            <p:fltVal val="0"/>
+                                          </p:val>
+                                        </p:tav>
+                                        <p:tav tm="100000">
+                                          <p:val>
+                                            <p:strVal val="#ppt_w"/>
+                                          </p:val>
+                                        </p:tav>
+                                      </p:tavLst>
+                                    </p:anim>
+                                    <p:anim calcmode="lin" valueType="num">
+                                      <p:cBhvr>
+                                        <p:cTn id="36" dur="500" fill="hold"/>
+                                        <p:tgtEl>
+                                          <p:spTgt spid="3">
+                                            <p:txEl>
+                                              <p:pRg st="5" end="5"/>
+                                            </p:txEl>
+                                          </p:spTgt>
+                                        </p:tgtEl>
+                                        <p:attrNameLst>
+                                          <p:attrName>ppt_h</p:attrName>
+                                        </p:attrNameLst>
+                                      </p:cBhvr>
+                                      <p:tavLst>
+                                        <p:tav tm="0">
+                                          <p:val>
+                                            <p:fltVal val="0"/>
+                                          </p:val>
+                                        </p:tav>
+                                        <p:tav tm="100000">
+                                          <p:val>
+                                            <p:strVal val="#ppt_h"/>
+                                          </p:val>
+                                        </p:tav>
+                                      </p:tavLst>
+                                    </p:anim>
+                                    <p:animEffect transition="in" filter="fade">
+                                      <p:cBhvr>
+                                        <p:cTn id="37" dur="500"/>
+                                        <p:tgtEl>
+                                          <p:spTgt spid="3">
+                                            <p:txEl>
+                                              <p:pRg st="5" end="5"/>
+                                            </p:txEl>
+                                          </p:spTgt>
+                                        </p:tgtEl>
+                                      </p:cBhvr>
+                                    </p:animEffect>
+                                  </p:childTnLst>
+                                </p:cTn>
+                              </p:par>
+                            </p:childTnLst>
+                          </p:cTn>
+                        </p:par>
+                      </p:childTnLst>
+                    </p:cTn>
+                  </p:par>
+                  <p:par>
+                    <p:cTn id="38" fill="hold">
+                      <p:stCondLst>
+                        <p:cond delay="indefinite"/>
+                      </p:stCondLst>
+                      <p:childTnLst>
+                        <p:par>
+                          <p:cTn id="39" fill="hold">
+                            <p:stCondLst>
+                              <p:cond delay="0"/>
+                            </p:stCondLst>
+                            <p:childTnLst>
+                              <p:par>
+                                <p:cTn id="40" presetID="53" presetClass="entr" presetSubtype="16" fill="hold" nodeType="clickEffect">
+                                  <p:stCondLst>
+                                    <p:cond delay="0"/>
+                                  </p:stCondLst>
+                                  <p:childTnLst>
+                                    <p:set>
+                                      <p:cBhvr>
+                                        <p:cTn id="41" dur="1" fill="hold">
+                                          <p:stCondLst>
+                                            <p:cond delay="0"/>
+                                          </p:stCondLst>
+                                        </p:cTn>
+                                        <p:tgtEl>
+                                          <p:spTgt spid="3">
+                                            <p:txEl>
+                                              <p:pRg st="6" end="6"/>
+                                            </p:txEl>
+                                          </p:spTgt>
+                                        </p:tgtEl>
+                                        <p:attrNameLst>
+                                          <p:attrName>style.visibility</p:attrName>
+                                        </p:attrNameLst>
+                                      </p:cBhvr>
+                                      <p:to>
+                                        <p:strVal val="visible"/>
+                                      </p:to>
+                                    </p:set>
+                                    <p:anim calcmode="lin" valueType="num">
+                                      <p:cBhvr>
+                                        <p:cTn id="42" dur="500" fill="hold"/>
+                                        <p:tgtEl>
+                                          <p:spTgt spid="3">
+                                            <p:txEl>
+                                              <p:pRg st="6" end="6"/>
+                                            </p:txEl>
+                                          </p:spTgt>
+                                        </p:tgtEl>
+                                        <p:attrNameLst>
+                                          <p:attrName>ppt_w</p:attrName>
+                                        </p:attrNameLst>
+                                      </p:cBhvr>
+                                      <p:tavLst>
+                                        <p:tav tm="0">
+                                          <p:val>
+                                            <p:fltVal val="0"/>
+                                          </p:val>
+                                        </p:tav>
+                                        <p:tav tm="100000">
+                                          <p:val>
+                                            <p:strVal val="#ppt_w"/>
+                                          </p:val>
+                                        </p:tav>
+                                      </p:tavLst>
+                                    </p:anim>
+                                    <p:anim calcmode="lin" valueType="num">
+                                      <p:cBhvr>
+                                        <p:cTn id="43" dur="500" fill="hold"/>
+                                        <p:tgtEl>
+                                          <p:spTgt spid="3">
+                                            <p:txEl>
+                                              <p:pRg st="6" end="6"/>
+                                            </p:txEl>
+                                          </p:spTgt>
+                                        </p:tgtEl>
+                                        <p:attrNameLst>
+                                          <p:attrName>ppt_h</p:attrName>
+                                        </p:attrNameLst>
+                                      </p:cBhvr>
+                                      <p:tavLst>
+                                        <p:tav tm="0">
+                                          <p:val>
+                                            <p:fltVal val="0"/>
+                                          </p:val>
+                                        </p:tav>
+                                        <p:tav tm="100000">
+                                          <p:val>
+                                            <p:strVal val="#ppt_h"/>
+                                          </p:val>
+                                        </p:tav>
+                                      </p:tavLst>
+                                    </p:anim>
+                                    <p:animEffect transition="in" filter="fade">
+                                      <p:cBhvr>
+                                        <p:cTn id="44" dur="500"/>
+                                        <p:tgtEl>
+                                          <p:spTgt spid="3">
+                                            <p:txEl>
+                                              <p:pRg st="6" end="6"/>
+                                            </p:txEl>
+                                          </p:spTgt>
+                                        </p:tgtEl>
+                                      </p:cBhvr>
+                                    </p:animEffect>
+                                  </p:childTnLst>
+                                </p:cTn>
+                              </p:par>
+                            </p:childTnLst>
+                          </p:cTn>
+                        </p:par>
+                      </p:childTnLst>
+                    </p:cTn>
+                  </p:par>
+                </p:childTnLst>
+              </p:cTn>
+              <p:prevCondLst>
+                <p:cond evt="onPrev" delay="0">
+                  <p:tgtEl>
+                    <p:sldTgt/>
+                  </p:tgtEl>
+                </p:cond>
+              </p:prevCondLst>
+              <p:nextCondLst>
+                <p:cond evt="onNext" delay="0">
+                  <p:tgtEl>
+                    <p:sldTgt/>
+                  </p:tgtEl>
+                </p:cond>
+              </p:nextCondLst>
+            </p:seq>
+          </p:childTnLst>
+        </p:cTn>
       </p:par>
     </p:tnLst>
   </p:timing>
@@ -8116,7 +9138,7 @@
           <p:nvPr/>
         </p:nvPicPr>
         <p:blipFill>
-          <a:blip r:embed="rId2">
+          <a:blip r:embed="rId3">
             <a:extLst>
               <a:ext uri="{28A0092B-C50C-407E-A947-70E740481C1C}">
                 <a14:useLocalDpi xmlns:a14="http://schemas.microsoft.com/office/drawing/2010/main" val="0"/>
@@ -8147,6 +9169,14 @@
   <p:clrMapOvr>
     <a:masterClrMapping/>
   </p:clrMapOvr>
+  <p:transition spd="slow">
+    <p:push dir="u"/>
+    <p:sndAc>
+      <p:stSnd>
+        <p:snd r:embed="rId2" name="Le-hurlement-du-loup.wav"/>
+      </p:stSnd>
+    </p:sndAc>
+  </p:transition>
   <p:timing>
     <p:tnLst>
       <p:par>

</xml_diff>

<commit_message>
ajout du dessin references #60
</commit_message>
<xml_diff>
--- a/doc/Presentation/Présentation_20_03_18_loup_garou.pptx
+++ b/doc/Presentation/Présentation_20_03_18_loup_garou.pptx
@@ -1453,11 +1453,6 @@
   </p:clrMapOvr>
   <p:transition spd="slow">
     <p:push dir="u"/>
-    <p:sndAc>
-      <p:stSnd>
-        <p:snd r:embed="rId1" name="Le-hurlement-du-loup.wav"/>
-      </p:stSnd>
-    </p:sndAc>
   </p:transition>
 </p:sldLayout>
 </file>
@@ -1626,11 +1621,6 @@
   </p:clrMapOvr>
   <p:transition spd="slow">
     <p:push dir="u"/>
-    <p:sndAc>
-      <p:stSnd>
-        <p:snd r:embed="rId1" name="Le-hurlement-du-loup.wav"/>
-      </p:stSnd>
-    </p:sndAc>
   </p:transition>
 </p:sldLayout>
 </file>
@@ -1809,11 +1799,6 @@
   </p:clrMapOvr>
   <p:transition spd="slow">
     <p:push dir="u"/>
-    <p:sndAc>
-      <p:stSnd>
-        <p:snd r:embed="rId1" name="Le-hurlement-du-loup.wav"/>
-      </p:stSnd>
-    </p:sndAc>
   </p:transition>
 </p:sldLayout>
 </file>
@@ -1982,11 +1967,6 @@
   </p:clrMapOvr>
   <p:transition spd="slow">
     <p:push dir="u"/>
-    <p:sndAc>
-      <p:stSnd>
-        <p:snd r:embed="rId1" name="Le-hurlement-du-loup.wav"/>
-      </p:stSnd>
-    </p:sndAc>
   </p:transition>
 </p:sldLayout>
 </file>
@@ -3232,11 +3212,6 @@
   </p:clrMapOvr>
   <p:transition spd="slow">
     <p:push dir="u"/>
-    <p:sndAc>
-      <p:stSnd>
-        <p:snd r:embed="rId1" name="Le-hurlement-du-loup.wav"/>
-      </p:stSnd>
-    </p:sndAc>
   </p:transition>
 </p:sldLayout>
 </file>
@@ -3467,11 +3442,6 @@
   </p:clrMapOvr>
   <p:transition spd="slow">
     <p:push dir="u"/>
-    <p:sndAc>
-      <p:stSnd>
-        <p:snd r:embed="rId1" name="Le-hurlement-du-loup.wav"/>
-      </p:stSnd>
-    </p:sndAc>
   </p:transition>
   <p:extLst mod="1">
     <p:ext uri="{DCECCB84-F9BA-43D5-87BE-67443E8EF086}">
@@ -3860,11 +3830,6 @@
   </p:clrMapOvr>
   <p:transition spd="slow">
     <p:push dir="u"/>
-    <p:sndAc>
-      <p:stSnd>
-        <p:snd r:embed="rId1" name="Le-hurlement-du-loup.wav"/>
-      </p:stSnd>
-    </p:sndAc>
   </p:transition>
   <p:extLst mod="1">
     <p:ext uri="{DCECCB84-F9BA-43D5-87BE-67443E8EF086}">
@@ -3986,11 +3951,6 @@
   </p:clrMapOvr>
   <p:transition spd="slow">
     <p:push dir="u"/>
-    <p:sndAc>
-      <p:stSnd>
-        <p:snd r:embed="rId1" name="Le-hurlement-du-loup.wav"/>
-      </p:stSnd>
-    </p:sndAc>
   </p:transition>
 </p:sldLayout>
 </file>
@@ -4084,11 +4044,6 @@
   </p:clrMapOvr>
   <p:transition spd="slow">
     <p:push dir="u"/>
-    <p:sndAc>
-      <p:stSnd>
-        <p:snd r:embed="rId1" name="Le-hurlement-du-loup.wav"/>
-      </p:stSnd>
-    </p:sndAc>
   </p:transition>
 </p:sldLayout>
 </file>
@@ -4898,11 +4853,6 @@
   </p:clrMapOvr>
   <p:transition spd="slow">
     <p:push dir="u"/>
-    <p:sndAc>
-      <p:stSnd>
-        <p:snd r:embed="rId1" name="Le-hurlement-du-loup.wav"/>
-      </p:stSnd>
-    </p:sndAc>
   </p:transition>
   <p:extLst mod="1">
     <p:ext uri="{DCECCB84-F9BA-43D5-87BE-67443E8EF086}">
@@ -5703,11 +5653,6 @@
   </p:clrMapOvr>
   <p:transition spd="slow">
     <p:push dir="u"/>
-    <p:sndAc>
-      <p:stSnd>
-        <p:snd r:embed="rId1" name="Le-hurlement-du-loup.wav"/>
-      </p:stSnd>
-    </p:sndAc>
   </p:transition>
 </p:sldLayout>
 </file>
@@ -6476,11 +6421,6 @@
   </p:sldLayoutIdLst>
   <p:transition spd="slow">
     <p:push dir="u"/>
-    <p:sndAc>
-      <p:stSnd>
-        <p:snd r:embed="rId13" name="Le-hurlement-du-loup.wav"/>
-      </p:stSnd>
-    </p:sndAc>
   </p:transition>
   <p:txStyles>
     <p:titleStyle>
@@ -6935,14 +6875,9 @@
   <p:clrMapOvr>
     <a:masterClrMapping/>
   </p:clrMapOvr>
-  <mc:AlternateContent xmlns:mc="http://schemas.openxmlformats.org/markup-compatibility/2006">
-    <mc:Choice xmlns:p14="http://schemas.microsoft.com/office/powerpoint/2010/main" Requires="p14">
-      <p:transition p14:dur="0"/>
-    </mc:Choice>
-    <mc:Fallback>
-      <p:transition/>
-    </mc:Fallback>
-  </mc:AlternateContent>
+  <p:transition spd="slow">
+    <p:push dir="u"/>
+  </p:transition>
   <p:timing>
     <p:tnLst>
       <p:par>
@@ -7109,7 +7044,7 @@
         <p:spPr>
           <a:xfrm>
             <a:off x="7839842" y="1498515"/>
-            <a:ext cx="3014207" cy="2220045"/>
+            <a:ext cx="2514649" cy="2220045"/>
           </a:xfrm>
           <a:prstGeom prst="rect">
             <a:avLst/>
@@ -7128,11 +7063,6 @@
   </p:clrMapOvr>
   <p:transition spd="slow">
     <p:push dir="u"/>
-    <p:sndAc>
-      <p:stSnd>
-        <p:snd r:embed="rId2" name="Le-hurlement-du-loup.wav"/>
-      </p:stSnd>
-    </p:sndAc>
   </p:transition>
   <p:timing>
     <p:tnLst>
@@ -7594,6 +7524,29 @@
                                       </p:cBhvr>
                                     </p:animEffect>
                                   </p:childTnLst>
+                                  <p:subTnLst>
+                                    <p:audio>
+                                      <p:cMediaNode>
+                                        <p:cTn display="0" masterRel="sameClick">
+                                          <p:stCondLst>
+                                            <p:cond evt="begin" delay="0">
+                                              <p:tn val="26"/>
+                                            </p:cond>
+                                          </p:stCondLst>
+                                          <p:endCondLst>
+                                            <p:cond evt="onStopAudio" delay="0">
+                                              <p:tgtEl>
+                                                <p:sldTgt/>
+                                              </p:tgtEl>
+                                            </p:cond>
+                                          </p:endCondLst>
+                                        </p:cTn>
+                                        <p:tgtEl>
+                                          <p:sndTgt r:embed="rId2" name="Le-hurlement-du-loup.wav"/>
+                                        </p:tgtEl>
+                                      </p:cMediaNode>
+                                    </p:audio>
+                                  </p:subTnLst>
                                 </p:cTn>
                               </p:par>
                             </p:childTnLst>
@@ -8055,6 +8008,36 @@
           </a:p>
         </p:txBody>
       </p:sp>
+      <p:pic>
+        <p:nvPicPr>
+          <p:cNvPr id="4" name="Image 3"/>
+          <p:cNvPicPr>
+            <a:picLocks noChangeAspect="1"/>
+          </p:cNvPicPr>
+          <p:nvPr/>
+        </p:nvPicPr>
+        <p:blipFill>
+          <a:blip r:embed="rId2">
+            <a:extLst>
+              <a:ext uri="{28A0092B-C50C-407E-A947-70E740481C1C}">
+                <a14:useLocalDpi xmlns:a14="http://schemas.microsoft.com/office/drawing/2010/main" val="0"/>
+              </a:ext>
+            </a:extLst>
+          </a:blip>
+          <a:stretch>
+            <a:fillRect/>
+          </a:stretch>
+        </p:blipFill>
+        <p:spPr>
+          <a:xfrm>
+            <a:off x="1892616" y="2301162"/>
+            <a:ext cx="8130950" cy="3479076"/>
+          </a:xfrm>
+          <a:prstGeom prst="rect">
+            <a:avLst/>
+          </a:prstGeom>
+        </p:spPr>
+      </p:pic>
     </p:spTree>
     <p:extLst>
       <p:ext uri="{BB962C8B-B14F-4D97-AF65-F5344CB8AC3E}">
@@ -8067,16 +8050,70 @@
   </p:clrMapOvr>
   <p:transition spd="slow">
     <p:push dir="u"/>
-    <p:sndAc>
-      <p:stSnd>
-        <p:snd r:embed="rId2" name="Le-hurlement-du-loup.wav"/>
-      </p:stSnd>
-    </p:sndAc>
   </p:transition>
   <p:timing>
     <p:tnLst>
       <p:par>
-        <p:cTn id="1" dur="indefinite" restart="never" nodeType="tmRoot"/>
+        <p:cTn id="1" dur="indefinite" restart="never" nodeType="tmRoot">
+          <p:childTnLst>
+            <p:seq concurrent="1" nextAc="seek">
+              <p:cTn id="2" dur="indefinite" nodeType="mainSeq">
+                <p:childTnLst>
+                  <p:par>
+                    <p:cTn id="3" fill="hold">
+                      <p:stCondLst>
+                        <p:cond delay="indefinite"/>
+                      </p:stCondLst>
+                      <p:childTnLst>
+                        <p:par>
+                          <p:cTn id="4" fill="hold">
+                            <p:stCondLst>
+                              <p:cond delay="0"/>
+                            </p:stCondLst>
+                            <p:childTnLst>
+                              <p:par>
+                                <p:cTn id="5" presetID="6" presetClass="emph" presetSubtype="0" fill="hold" nodeType="clickEffect">
+                                  <p:stCondLst>
+                                    <p:cond delay="0"/>
+                                  </p:stCondLst>
+                                  <p:childTnLst>
+                                    <p:animScale>
+                                      <p:cBhvr>
+                                        <p:cTn id="6" dur="2000" fill="hold"/>
+                                        <p:tgtEl>
+                                          <p:spTgt spid="4"/>
+                                        </p:tgtEl>
+                                      </p:cBhvr>
+                                      <p:by x="150000" y="150000"/>
+                                    </p:animScale>
+                                  </p:childTnLst>
+                                </p:cTn>
+                              </p:par>
+                            </p:childTnLst>
+                          </p:cTn>
+                        </p:par>
+                      </p:childTnLst>
+                    </p:cTn>
+                  </p:par>
+                </p:childTnLst>
+              </p:cTn>
+              <p:prevCondLst>
+                <p:cond evt="onPrev" delay="0">
+                  <p:tgtEl>
+                    <p:sldTgt/>
+                  </p:tgtEl>
+                </p:cond>
+              </p:prevCondLst>
+              <p:nextCondLst>
+                <p:cond evt="onNext" delay="0">
+                  <p:tgtEl>
+                    <p:sldTgt/>
+                  </p:tgtEl>
+                </p:cond>
+              </p:nextCondLst>
+            </p:seq>
+          </p:childTnLst>
+        </p:cTn>
       </p:par>
     </p:tnLst>
   </p:timing>
@@ -8155,11 +8192,6 @@
   </p:clrMapOvr>
   <p:transition spd="slow">
     <p:push dir="u"/>
-    <p:sndAc>
-      <p:stSnd>
-        <p:snd r:embed="rId2" name="Le-hurlement-du-loup.wav"/>
-      </p:stSnd>
-    </p:sndAc>
   </p:transition>
   <p:timing>
     <p:tnLst>
@@ -8293,7 +8325,7 @@
           <p:nvPr/>
         </p:nvPicPr>
         <p:blipFill>
-          <a:blip r:embed="rId3">
+          <a:blip r:embed="rId2">
             <a:extLst>
               <a:ext uri="{28A0092B-C50C-407E-A947-70E740481C1C}">
                 <a14:useLocalDpi xmlns:a14="http://schemas.microsoft.com/office/drawing/2010/main" val="0"/>
@@ -8326,11 +8358,6 @@
   </p:clrMapOvr>
   <p:transition spd="slow">
     <p:push dir="u"/>
-    <p:sndAc>
-      <p:stSnd>
-        <p:snd r:embed="rId2" name="Le-hurlement-du-loup.wav"/>
-      </p:stSnd>
-    </p:sndAc>
   </p:transition>
   <p:timing>
     <p:tnLst>
@@ -9123,7 +9150,15 @@
             </a:pPr>
             <a:r>
               <a:rPr lang="fr-FR" sz="4800" dirty="0" smtClean="0"/>
-              <a:t>Venez découvrir votre part bestial à notre table ! </a:t>
+              <a:t>Venez découvrir votre part </a:t>
+            </a:r>
+            <a:r>
+              <a:rPr lang="fr-FR" sz="4800" dirty="0" smtClean="0"/>
+              <a:t>bestiale </a:t>
+            </a:r>
+            <a:r>
+              <a:rPr lang="fr-FR" sz="4800" dirty="0" smtClean="0"/>
+              <a:t>à notre table ! </a:t>
             </a:r>
             <a:endParaRPr lang="fr-FR" sz="4800" dirty="0"/>
           </a:p>
@@ -9138,7 +9173,7 @@
           <p:nvPr/>
         </p:nvPicPr>
         <p:blipFill>
-          <a:blip r:embed="rId3">
+          <a:blip r:embed="rId2">
             <a:extLst>
               <a:ext uri="{28A0092B-C50C-407E-A947-70E740481C1C}">
                 <a14:useLocalDpi xmlns:a14="http://schemas.microsoft.com/office/drawing/2010/main" val="0"/>
@@ -9171,11 +9206,6 @@
   </p:clrMapOvr>
   <p:transition spd="slow">
     <p:push dir="u"/>
-    <p:sndAc>
-      <p:stSnd>
-        <p:snd r:embed="rId2" name="Le-hurlement-du-loup.wav"/>
-      </p:stSnd>
-    </p:sndAc>
   </p:transition>
   <p:timing>
     <p:tnLst>

</xml_diff>